<commit_message>
Comments, Powerpoint updates, Powerpoint PDF
</commit_message>
<xml_diff>
--- a/Elevators in NYC - Project Introduction.pptx
+++ b/Elevators in NYC - Project Introduction.pptx
@@ -9,10 +9,10 @@
     <p:sldId id="257" r:id="rId3"/>
     <p:sldId id="258" r:id="rId4"/>
     <p:sldId id="259" r:id="rId5"/>
-    <p:sldId id="260" r:id="rId6"/>
-    <p:sldId id="261" r:id="rId7"/>
-    <p:sldId id="262" r:id="rId8"/>
-    <p:sldId id="263" r:id="rId9"/>
+    <p:sldId id="263" r:id="rId6"/>
+    <p:sldId id="260" r:id="rId7"/>
+    <p:sldId id="261" r:id="rId8"/>
+    <p:sldId id="262" r:id="rId9"/>
   </p:sldIdLst>
   <p:sldSz cx="12192000" cy="6858000"/>
   <p:notesSz cx="6858000" cy="9144000"/>
@@ -253,11 +253,11 @@
         </c:dLbls>
         <c:gapWidth val="150"/>
         <c:overlap val="100"/>
-        <c:axId val="-2115777584"/>
-        <c:axId val="-2111882160"/>
+        <c:axId val="2123961760"/>
+        <c:axId val="2140472496"/>
       </c:barChart>
       <c:catAx>
-        <c:axId val="-2115777584"/>
+        <c:axId val="2123961760"/>
         <c:scaling>
           <c:orientation val="minMax"/>
         </c:scaling>
@@ -300,7 +300,7 @@
             <a:endParaRPr lang="en-US"/>
           </a:p>
         </c:txPr>
-        <c:crossAx val="-2111882160"/>
+        <c:crossAx val="2140472496"/>
         <c:crosses val="autoZero"/>
         <c:auto val="1"/>
         <c:lblAlgn val="ctr"/>
@@ -308,7 +308,7 @@
         <c:noMultiLvlLbl val="0"/>
       </c:catAx>
       <c:valAx>
-        <c:axId val="-2111882160"/>
+        <c:axId val="2140472496"/>
         <c:scaling>
           <c:orientation val="minMax"/>
         </c:scaling>
@@ -359,7 +359,7 @@
             <a:endParaRPr lang="en-US"/>
           </a:p>
         </c:txPr>
-        <c:crossAx val="-2115777584"/>
+        <c:crossAx val="2123961760"/>
         <c:crosses val="autoZero"/>
         <c:crossBetween val="between"/>
       </c:valAx>
@@ -1209,7 +1209,7 @@
             <a:fld id="{5586B75A-687E-405C-8A0B-8D00578BA2C3}" type="datetimeFigureOut">
               <a:rPr lang="en-US" dirty="0"/>
               <a:pPr/>
-              <a:t>1/19/17</a:t>
+              <a:t>2/5/17</a:t>
             </a:fld>
             <a:endParaRPr lang="en-US" dirty="0"/>
           </a:p>
@@ -1376,7 +1376,7 @@
             <a:fld id="{5586B75A-687E-405C-8A0B-8D00578BA2C3}" type="datetimeFigureOut">
               <a:rPr lang="en-US" dirty="0"/>
               <a:pPr/>
-              <a:t>1/19/17</a:t>
+              <a:t>2/5/17</a:t>
             </a:fld>
             <a:endParaRPr lang="en-US" dirty="0"/>
           </a:p>
@@ -1553,7 +1553,7 @@
             <a:fld id="{5586B75A-687E-405C-8A0B-8D00578BA2C3}" type="datetimeFigureOut">
               <a:rPr lang="en-US" dirty="0"/>
               <a:pPr/>
-              <a:t>1/19/17</a:t>
+              <a:t>2/5/17</a:t>
             </a:fld>
             <a:endParaRPr lang="en-US" dirty="0"/>
           </a:p>
@@ -1720,7 +1720,7 @@
             <a:fld id="{5586B75A-687E-405C-8A0B-8D00578BA2C3}" type="datetimeFigureOut">
               <a:rPr lang="en-US" dirty="0"/>
               <a:pPr/>
-              <a:t>1/19/17</a:t>
+              <a:t>2/5/17</a:t>
             </a:fld>
             <a:endParaRPr lang="en-US" dirty="0"/>
           </a:p>
@@ -1975,7 +1975,7 @@
             <a:fld id="{5586B75A-687E-405C-8A0B-8D00578BA2C3}" type="datetimeFigureOut">
               <a:rPr lang="en-US" dirty="0"/>
               <a:pPr/>
-              <a:t>1/19/17</a:t>
+              <a:t>2/5/17</a:t>
             </a:fld>
             <a:endParaRPr lang="en-US" dirty="0"/>
           </a:p>
@@ -2260,7 +2260,7 @@
             <a:fld id="{5586B75A-687E-405C-8A0B-8D00578BA2C3}" type="datetimeFigureOut">
               <a:rPr lang="en-US" dirty="0"/>
               <a:pPr/>
-              <a:t>1/19/17</a:t>
+              <a:t>2/5/17</a:t>
             </a:fld>
             <a:endParaRPr lang="en-US" dirty="0"/>
           </a:p>
@@ -2699,7 +2699,7 @@
             <a:fld id="{5586B75A-687E-405C-8A0B-8D00578BA2C3}" type="datetimeFigureOut">
               <a:rPr lang="en-US" dirty="0"/>
               <a:pPr/>
-              <a:t>1/19/17</a:t>
+              <a:t>2/5/17</a:t>
             </a:fld>
             <a:endParaRPr lang="en-US" dirty="0"/>
           </a:p>
@@ -2814,7 +2814,7 @@
             <a:fld id="{5586B75A-687E-405C-8A0B-8D00578BA2C3}" type="datetimeFigureOut">
               <a:rPr lang="en-US" dirty="0"/>
               <a:pPr/>
-              <a:t>1/19/17</a:t>
+              <a:t>2/5/17</a:t>
             </a:fld>
             <a:endParaRPr lang="en-US" dirty="0"/>
           </a:p>
@@ -2906,7 +2906,7 @@
             <a:fld id="{5586B75A-687E-405C-8A0B-8D00578BA2C3}" type="datetimeFigureOut">
               <a:rPr lang="en-US" dirty="0"/>
               <a:pPr/>
-              <a:t>1/19/17</a:t>
+              <a:t>2/5/17</a:t>
             </a:fld>
             <a:endParaRPr lang="en-US" dirty="0"/>
           </a:p>
@@ -3191,7 +3191,7 @@
             <a:fld id="{5586B75A-687E-405C-8A0B-8D00578BA2C3}" type="datetimeFigureOut">
               <a:rPr lang="en-US" dirty="0"/>
               <a:pPr/>
-              <a:t>1/19/17</a:t>
+              <a:t>2/5/17</a:t>
             </a:fld>
             <a:endParaRPr lang="en-US" dirty="0"/>
           </a:p>
@@ -3461,7 +3461,7 @@
             <a:fld id="{5586B75A-687E-405C-8A0B-8D00578BA2C3}" type="datetimeFigureOut">
               <a:rPr lang="en-US" dirty="0"/>
               <a:pPr/>
-              <a:t>1/19/17</a:t>
+              <a:t>2/5/17</a:t>
             </a:fld>
             <a:endParaRPr lang="en-US" dirty="0"/>
           </a:p>
@@ -3755,7 +3755,7 @@
             <a:fld id="{5586B75A-687E-405C-8A0B-8D00578BA2C3}" type="datetimeFigureOut">
               <a:rPr lang="en-US" dirty="0"/>
               <a:pPr/>
-              <a:t>1/19/17</a:t>
+              <a:t>2/5/17</a:t>
             </a:fld>
             <a:endParaRPr lang="en-US" dirty="0"/>
           </a:p>
@@ -4294,6 +4294,41 @@
           </a:p>
         </p:txBody>
       </p:sp>
+      <p:pic>
+        <p:nvPicPr>
+          <p:cNvPr id="4" name="Picture 3"/>
+          <p:cNvPicPr>
+            <a:picLocks noChangeAspect="1"/>
+          </p:cNvPicPr>
+          <p:nvPr/>
+        </p:nvPicPr>
+        <p:blipFill>
+          <a:blip r:embed="rId2">
+            <a:clrChange>
+              <a:clrFrom>
+                <a:srgbClr val="FFFFFF"/>
+              </a:clrFrom>
+              <a:clrTo>
+                <a:srgbClr val="FFFFFF">
+                  <a:alpha val="0"/>
+                </a:srgbClr>
+              </a:clrTo>
+            </a:clrChange>
+          </a:blip>
+          <a:stretch>
+            <a:fillRect/>
+          </a:stretch>
+        </p:blipFill>
+        <p:spPr>
+          <a:xfrm>
+            <a:off x="10058115" y="2185590"/>
+            <a:ext cx="1265055" cy="2368122"/>
+          </a:xfrm>
+          <a:prstGeom prst="rect">
+            <a:avLst/>
+          </a:prstGeom>
+        </p:spPr>
+      </p:pic>
     </p:spTree>
     <p:extLst>
       <p:ext uri="{BB962C8B-B14F-4D97-AF65-F5344CB8AC3E}">
@@ -4304,6 +4339,13 @@
   <p:clrMapOvr>
     <a:masterClrMapping/>
   </p:clrMapOvr>
+  <p:timing>
+    <p:tnLst>
+      <p:par>
+        <p:cTn id="1" dur="indefinite" restart="never" nodeType="tmRoot"/>
+      </p:par>
+    </p:tnLst>
+  </p:timing>
 </p:sld>
 </file>
 
@@ -4524,6 +4566,13 @@
   <p:clrMapOvr>
     <a:masterClrMapping/>
   </p:clrMapOvr>
+  <p:timing>
+    <p:tnLst>
+      <p:par>
+        <p:cTn id="1" dur="indefinite" restart="never" nodeType="tmRoot"/>
+      </p:par>
+    </p:tnLst>
+  </p:timing>
 </p:sld>
 </file>
 
@@ -5289,15 +5338,7 @@
             </a:r>
             <a:r>
               <a:rPr lang="en-US" dirty="0" smtClean="0"/>
-              <a:t>: </a:t>
-            </a:r>
-            <a:r>
-              <a:rPr lang="en-US" dirty="0" smtClean="0"/>
-              <a:t>11% </a:t>
-            </a:r>
-            <a:r>
-              <a:rPr lang="en-US" dirty="0" smtClean="0"/>
-              <a:t>of the dataset did not have zip code data</a:t>
+              <a:t>: 11% of the dataset did not have zip code data</a:t>
             </a:r>
           </a:p>
           <a:p>
@@ -5327,17 +5368,12 @@
             </a:r>
             <a:r>
               <a:rPr lang="en-US" i="1" dirty="0" smtClean="0"/>
-              <a:t>(raw code attached as text document</a:t>
-            </a:r>
-            <a:r>
-              <a:rPr lang="en-US" i="1" dirty="0" smtClean="0"/>
-              <a:t>) </a:t>
+              <a:t>(raw code attached as text document) </a:t>
             </a:r>
             <a:r>
               <a:rPr lang="en-US" dirty="0" smtClean="0"/>
               <a:t>for nearly 10% of the data set (~0.2% remained  unresolved after geocoding)</a:t>
             </a:r>
-            <a:endParaRPr lang="en-US" dirty="0" smtClean="0"/>
           </a:p>
           <a:p>
             <a:pPr marL="0" indent="0">
@@ -5442,6 +5478,833 @@
           <a:chExt cx="0" cy="0"/>
         </a:xfrm>
       </p:grpSpPr>
+      <p:pic>
+        <p:nvPicPr>
+          <p:cNvPr id="3" name="Picture 2"/>
+          <p:cNvPicPr>
+            <a:picLocks noChangeAspect="1"/>
+          </p:cNvPicPr>
+          <p:nvPr/>
+        </p:nvPicPr>
+        <p:blipFill rotWithShape="1">
+          <a:blip r:embed="rId2"/>
+          <a:srcRect l="3501" t="21382" r="79390" b="55850"/>
+          <a:stretch/>
+        </p:blipFill>
+        <p:spPr>
+          <a:xfrm>
+            <a:off x="1383322" y="2051539"/>
+            <a:ext cx="4407877" cy="3299464"/>
+          </a:xfrm>
+          <a:prstGeom prst="rect">
+            <a:avLst/>
+          </a:prstGeom>
+        </p:spPr>
+      </p:pic>
+      <p:sp>
+        <p:nvSpPr>
+          <p:cNvPr id="5" name="TextBox 4"/>
+          <p:cNvSpPr txBox="1"/>
+          <p:nvPr/>
+        </p:nvSpPr>
+        <p:spPr>
+          <a:xfrm>
+            <a:off x="281354" y="120682"/>
+            <a:ext cx="4681090" cy="461665"/>
+          </a:xfrm>
+          <a:prstGeom prst="rect">
+            <a:avLst/>
+          </a:prstGeom>
+          <a:noFill/>
+        </p:spPr>
+        <p:txBody>
+          <a:bodyPr wrap="none" rtlCol="0">
+            <a:spAutoFit/>
+          </a:bodyPr>
+          <a:lstStyle/>
+          <a:p>
+            <a:r>
+              <a:rPr lang="en-US" sz="2400" dirty="0" smtClean="0"/>
+              <a:t>Updates to </a:t>
+            </a:r>
+            <a:r>
+              <a:rPr lang="en-US" sz="2400" dirty="0" err="1" smtClean="0"/>
+              <a:t>FiveThirtyEight</a:t>
+            </a:r>
+            <a:r>
+              <a:rPr lang="en-US" sz="2400" dirty="0" smtClean="0"/>
+              <a:t> analysis</a:t>
+            </a:r>
+            <a:endParaRPr lang="en-US" sz="2400" dirty="0"/>
+          </a:p>
+        </p:txBody>
+      </p:sp>
+      <p:sp>
+        <p:nvSpPr>
+          <p:cNvPr id="6" name="TextBox 5"/>
+          <p:cNvSpPr txBox="1"/>
+          <p:nvPr/>
+        </p:nvSpPr>
+        <p:spPr>
+          <a:xfrm>
+            <a:off x="1854683" y="1660513"/>
+            <a:ext cx="3780202" cy="338554"/>
+          </a:xfrm>
+          <a:prstGeom prst="rect">
+            <a:avLst/>
+          </a:prstGeom>
+          <a:noFill/>
+        </p:spPr>
+        <p:txBody>
+          <a:bodyPr wrap="none" rtlCol="0">
+            <a:spAutoFit/>
+          </a:bodyPr>
+          <a:lstStyle>
+            <a:defPPr>
+              <a:defRPr lang="en-US"/>
+            </a:defPPr>
+            <a:lvl1pPr marL="0" algn="l" defTabSz="457200" rtl="0" eaLnBrk="1" latinLnBrk="0" hangingPunct="1">
+              <a:defRPr sz="1800" kern="1200">
+                <a:solidFill>
+                  <a:schemeClr val="tx1"/>
+                </a:solidFill>
+                <a:latin typeface="+mn-lt"/>
+                <a:ea typeface="+mn-ea"/>
+                <a:cs typeface="+mn-cs"/>
+              </a:defRPr>
+            </a:lvl1pPr>
+            <a:lvl2pPr marL="457200" algn="l" defTabSz="457200" rtl="0" eaLnBrk="1" latinLnBrk="0" hangingPunct="1">
+              <a:defRPr sz="1800" kern="1200">
+                <a:solidFill>
+                  <a:schemeClr val="tx1"/>
+                </a:solidFill>
+                <a:latin typeface="+mn-lt"/>
+                <a:ea typeface="+mn-ea"/>
+                <a:cs typeface="+mn-cs"/>
+              </a:defRPr>
+            </a:lvl2pPr>
+            <a:lvl3pPr marL="914400" algn="l" defTabSz="457200" rtl="0" eaLnBrk="1" latinLnBrk="0" hangingPunct="1">
+              <a:defRPr sz="1800" kern="1200">
+                <a:solidFill>
+                  <a:schemeClr val="tx1"/>
+                </a:solidFill>
+                <a:latin typeface="+mn-lt"/>
+                <a:ea typeface="+mn-ea"/>
+                <a:cs typeface="+mn-cs"/>
+              </a:defRPr>
+            </a:lvl3pPr>
+            <a:lvl4pPr marL="1371600" algn="l" defTabSz="457200" rtl="0" eaLnBrk="1" latinLnBrk="0" hangingPunct="1">
+              <a:defRPr sz="1800" kern="1200">
+                <a:solidFill>
+                  <a:schemeClr val="tx1"/>
+                </a:solidFill>
+                <a:latin typeface="+mn-lt"/>
+                <a:ea typeface="+mn-ea"/>
+                <a:cs typeface="+mn-cs"/>
+              </a:defRPr>
+            </a:lvl4pPr>
+            <a:lvl5pPr marL="1828800" algn="l" defTabSz="457200" rtl="0" eaLnBrk="1" latinLnBrk="0" hangingPunct="1">
+              <a:defRPr sz="1800" kern="1200">
+                <a:solidFill>
+                  <a:schemeClr val="tx1"/>
+                </a:solidFill>
+                <a:latin typeface="+mn-lt"/>
+                <a:ea typeface="+mn-ea"/>
+                <a:cs typeface="+mn-cs"/>
+              </a:defRPr>
+            </a:lvl5pPr>
+            <a:lvl6pPr marL="2286000" algn="l" defTabSz="457200" rtl="0" eaLnBrk="1" latinLnBrk="0" hangingPunct="1">
+              <a:defRPr sz="1800" kern="1200">
+                <a:solidFill>
+                  <a:schemeClr val="tx1"/>
+                </a:solidFill>
+                <a:latin typeface="+mn-lt"/>
+                <a:ea typeface="+mn-ea"/>
+                <a:cs typeface="+mn-cs"/>
+              </a:defRPr>
+            </a:lvl6pPr>
+            <a:lvl7pPr marL="2743200" algn="l" defTabSz="457200" rtl="0" eaLnBrk="1" latinLnBrk="0" hangingPunct="1">
+              <a:defRPr sz="1800" kern="1200">
+                <a:solidFill>
+                  <a:schemeClr val="tx1"/>
+                </a:solidFill>
+                <a:latin typeface="+mn-lt"/>
+                <a:ea typeface="+mn-ea"/>
+                <a:cs typeface="+mn-cs"/>
+              </a:defRPr>
+            </a:lvl7pPr>
+            <a:lvl8pPr marL="3200400" algn="l" defTabSz="457200" rtl="0" eaLnBrk="1" latinLnBrk="0" hangingPunct="1">
+              <a:defRPr sz="1800" kern="1200">
+                <a:solidFill>
+                  <a:schemeClr val="tx1"/>
+                </a:solidFill>
+                <a:latin typeface="+mn-lt"/>
+                <a:ea typeface="+mn-ea"/>
+                <a:cs typeface="+mn-cs"/>
+              </a:defRPr>
+            </a:lvl8pPr>
+            <a:lvl9pPr marL="3657600" algn="l" defTabSz="457200" rtl="0" eaLnBrk="1" latinLnBrk="0" hangingPunct="1">
+              <a:defRPr sz="1800" kern="1200">
+                <a:solidFill>
+                  <a:schemeClr val="tx1"/>
+                </a:solidFill>
+                <a:latin typeface="+mn-lt"/>
+                <a:ea typeface="+mn-ea"/>
+                <a:cs typeface="+mn-cs"/>
+              </a:defRPr>
+            </a:lvl9pPr>
+          </a:lstStyle>
+          <a:p>
+            <a:r>
+              <a:rPr lang="en-US" sz="1600" b="1" u="sng" dirty="0" smtClean="0"/>
+              <a:t>Original table from </a:t>
+            </a:r>
+            <a:r>
+              <a:rPr lang="en-US" sz="1600" b="1" u="sng" dirty="0" err="1" smtClean="0"/>
+              <a:t>FiveThirtyEight</a:t>
+            </a:r>
+            <a:r>
+              <a:rPr lang="en-US" sz="1600" b="1" u="sng" dirty="0" smtClean="0"/>
+              <a:t> story</a:t>
+            </a:r>
+            <a:endParaRPr lang="en-US" sz="1600" b="1" u="sng" dirty="0"/>
+          </a:p>
+        </p:txBody>
+      </p:sp>
+      <p:sp>
+        <p:nvSpPr>
+          <p:cNvPr id="7" name="TextBox 6"/>
+          <p:cNvSpPr txBox="1"/>
+          <p:nvPr/>
+        </p:nvSpPr>
+        <p:spPr>
+          <a:xfrm>
+            <a:off x="7387976" y="1660513"/>
+            <a:ext cx="2777492" cy="338554"/>
+          </a:xfrm>
+          <a:prstGeom prst="rect">
+            <a:avLst/>
+          </a:prstGeom>
+          <a:noFill/>
+        </p:spPr>
+        <p:txBody>
+          <a:bodyPr wrap="none" rtlCol="0">
+            <a:spAutoFit/>
+          </a:bodyPr>
+          <a:lstStyle>
+            <a:defPPr>
+              <a:defRPr lang="en-US"/>
+            </a:defPPr>
+            <a:lvl1pPr marL="0" algn="l" defTabSz="457200" rtl="0" eaLnBrk="1" latinLnBrk="0" hangingPunct="1">
+              <a:defRPr sz="1800" kern="1200">
+                <a:solidFill>
+                  <a:schemeClr val="tx1"/>
+                </a:solidFill>
+                <a:latin typeface="+mn-lt"/>
+                <a:ea typeface="+mn-ea"/>
+                <a:cs typeface="+mn-cs"/>
+              </a:defRPr>
+            </a:lvl1pPr>
+            <a:lvl2pPr marL="457200" algn="l" defTabSz="457200" rtl="0" eaLnBrk="1" latinLnBrk="0" hangingPunct="1">
+              <a:defRPr sz="1800" kern="1200">
+                <a:solidFill>
+                  <a:schemeClr val="tx1"/>
+                </a:solidFill>
+                <a:latin typeface="+mn-lt"/>
+                <a:ea typeface="+mn-ea"/>
+                <a:cs typeface="+mn-cs"/>
+              </a:defRPr>
+            </a:lvl2pPr>
+            <a:lvl3pPr marL="914400" algn="l" defTabSz="457200" rtl="0" eaLnBrk="1" latinLnBrk="0" hangingPunct="1">
+              <a:defRPr sz="1800" kern="1200">
+                <a:solidFill>
+                  <a:schemeClr val="tx1"/>
+                </a:solidFill>
+                <a:latin typeface="+mn-lt"/>
+                <a:ea typeface="+mn-ea"/>
+                <a:cs typeface="+mn-cs"/>
+              </a:defRPr>
+            </a:lvl3pPr>
+            <a:lvl4pPr marL="1371600" algn="l" defTabSz="457200" rtl="0" eaLnBrk="1" latinLnBrk="0" hangingPunct="1">
+              <a:defRPr sz="1800" kern="1200">
+                <a:solidFill>
+                  <a:schemeClr val="tx1"/>
+                </a:solidFill>
+                <a:latin typeface="+mn-lt"/>
+                <a:ea typeface="+mn-ea"/>
+                <a:cs typeface="+mn-cs"/>
+              </a:defRPr>
+            </a:lvl4pPr>
+            <a:lvl5pPr marL="1828800" algn="l" defTabSz="457200" rtl="0" eaLnBrk="1" latinLnBrk="0" hangingPunct="1">
+              <a:defRPr sz="1800" kern="1200">
+                <a:solidFill>
+                  <a:schemeClr val="tx1"/>
+                </a:solidFill>
+                <a:latin typeface="+mn-lt"/>
+                <a:ea typeface="+mn-ea"/>
+                <a:cs typeface="+mn-cs"/>
+              </a:defRPr>
+            </a:lvl5pPr>
+            <a:lvl6pPr marL="2286000" algn="l" defTabSz="457200" rtl="0" eaLnBrk="1" latinLnBrk="0" hangingPunct="1">
+              <a:defRPr sz="1800" kern="1200">
+                <a:solidFill>
+                  <a:schemeClr val="tx1"/>
+                </a:solidFill>
+                <a:latin typeface="+mn-lt"/>
+                <a:ea typeface="+mn-ea"/>
+                <a:cs typeface="+mn-cs"/>
+              </a:defRPr>
+            </a:lvl6pPr>
+            <a:lvl7pPr marL="2743200" algn="l" defTabSz="457200" rtl="0" eaLnBrk="1" latinLnBrk="0" hangingPunct="1">
+              <a:defRPr sz="1800" kern="1200">
+                <a:solidFill>
+                  <a:schemeClr val="tx1"/>
+                </a:solidFill>
+                <a:latin typeface="+mn-lt"/>
+                <a:ea typeface="+mn-ea"/>
+                <a:cs typeface="+mn-cs"/>
+              </a:defRPr>
+            </a:lvl7pPr>
+            <a:lvl8pPr marL="3200400" algn="l" defTabSz="457200" rtl="0" eaLnBrk="1" latinLnBrk="0" hangingPunct="1">
+              <a:defRPr sz="1800" kern="1200">
+                <a:solidFill>
+                  <a:schemeClr val="tx1"/>
+                </a:solidFill>
+                <a:latin typeface="+mn-lt"/>
+                <a:ea typeface="+mn-ea"/>
+                <a:cs typeface="+mn-cs"/>
+              </a:defRPr>
+            </a:lvl8pPr>
+            <a:lvl9pPr marL="3657600" algn="l" defTabSz="457200" rtl="0" eaLnBrk="1" latinLnBrk="0" hangingPunct="1">
+              <a:defRPr sz="1800" kern="1200">
+                <a:solidFill>
+                  <a:schemeClr val="tx1"/>
+                </a:solidFill>
+                <a:latin typeface="+mn-lt"/>
+                <a:ea typeface="+mn-ea"/>
+                <a:cs typeface="+mn-cs"/>
+              </a:defRPr>
+            </a:lvl9pPr>
+          </a:lstStyle>
+          <a:p>
+            <a:r>
+              <a:rPr lang="en-US" sz="1600" b="1" u="sng" dirty="0" smtClean="0"/>
+              <a:t>Updated number of elevators</a:t>
+            </a:r>
+            <a:endParaRPr lang="en-US" sz="1600" b="1" u="sng" dirty="0"/>
+          </a:p>
+        </p:txBody>
+      </p:sp>
+      <p:cxnSp>
+        <p:nvCxnSpPr>
+          <p:cNvPr id="9" name="Straight Arrow Connector 8"/>
+          <p:cNvCxnSpPr/>
+          <p:nvPr/>
+        </p:nvCxnSpPr>
+        <p:spPr>
+          <a:xfrm>
+            <a:off x="5861538" y="3305908"/>
+            <a:ext cx="1230924" cy="0"/>
+          </a:xfrm>
+          <a:prstGeom prst="straightConnector1">
+            <a:avLst/>
+          </a:prstGeom>
+          <a:ln>
+            <a:tailEnd type="triangle"/>
+          </a:ln>
+        </p:spPr>
+        <p:style>
+          <a:lnRef idx="1">
+            <a:schemeClr val="accent1"/>
+          </a:lnRef>
+          <a:fillRef idx="0">
+            <a:schemeClr val="accent1"/>
+          </a:fillRef>
+          <a:effectRef idx="0">
+            <a:schemeClr val="accent1"/>
+          </a:effectRef>
+          <a:fontRef idx="minor">
+            <a:schemeClr val="tx1"/>
+          </a:fontRef>
+        </p:style>
+      </p:cxnSp>
+      <p:cxnSp>
+        <p:nvCxnSpPr>
+          <p:cNvPr id="10" name="Straight Arrow Connector 9"/>
+          <p:cNvCxnSpPr/>
+          <p:nvPr/>
+        </p:nvCxnSpPr>
+        <p:spPr>
+          <a:xfrm>
+            <a:off x="5861538" y="3653059"/>
+            <a:ext cx="1230924" cy="0"/>
+          </a:xfrm>
+          <a:prstGeom prst="straightConnector1">
+            <a:avLst/>
+          </a:prstGeom>
+          <a:ln>
+            <a:tailEnd type="triangle"/>
+          </a:ln>
+        </p:spPr>
+        <p:style>
+          <a:lnRef idx="1">
+            <a:schemeClr val="accent1"/>
+          </a:lnRef>
+          <a:fillRef idx="0">
+            <a:schemeClr val="accent1"/>
+          </a:fillRef>
+          <a:effectRef idx="0">
+            <a:schemeClr val="accent1"/>
+          </a:effectRef>
+          <a:fontRef idx="minor">
+            <a:schemeClr val="tx1"/>
+          </a:fontRef>
+        </p:style>
+      </p:cxnSp>
+      <p:cxnSp>
+        <p:nvCxnSpPr>
+          <p:cNvPr id="11" name="Straight Arrow Connector 10"/>
+          <p:cNvCxnSpPr/>
+          <p:nvPr/>
+        </p:nvCxnSpPr>
+        <p:spPr>
+          <a:xfrm>
+            <a:off x="5861538" y="4000210"/>
+            <a:ext cx="1230924" cy="0"/>
+          </a:xfrm>
+          <a:prstGeom prst="straightConnector1">
+            <a:avLst/>
+          </a:prstGeom>
+          <a:ln>
+            <a:tailEnd type="triangle"/>
+          </a:ln>
+        </p:spPr>
+        <p:style>
+          <a:lnRef idx="1">
+            <a:schemeClr val="accent1"/>
+          </a:lnRef>
+          <a:fillRef idx="0">
+            <a:schemeClr val="accent1"/>
+          </a:fillRef>
+          <a:effectRef idx="0">
+            <a:schemeClr val="accent1"/>
+          </a:effectRef>
+          <a:fontRef idx="minor">
+            <a:schemeClr val="tx1"/>
+          </a:fontRef>
+        </p:style>
+      </p:cxnSp>
+      <p:cxnSp>
+        <p:nvCxnSpPr>
+          <p:cNvPr id="12" name="Straight Arrow Connector 11"/>
+          <p:cNvCxnSpPr/>
+          <p:nvPr/>
+        </p:nvCxnSpPr>
+        <p:spPr>
+          <a:xfrm>
+            <a:off x="5861538" y="4347361"/>
+            <a:ext cx="1230924" cy="0"/>
+          </a:xfrm>
+          <a:prstGeom prst="straightConnector1">
+            <a:avLst/>
+          </a:prstGeom>
+          <a:ln>
+            <a:tailEnd type="triangle"/>
+          </a:ln>
+        </p:spPr>
+        <p:style>
+          <a:lnRef idx="1">
+            <a:schemeClr val="accent1"/>
+          </a:lnRef>
+          <a:fillRef idx="0">
+            <a:schemeClr val="accent1"/>
+          </a:fillRef>
+          <a:effectRef idx="0">
+            <a:schemeClr val="accent1"/>
+          </a:effectRef>
+          <a:fontRef idx="minor">
+            <a:schemeClr val="tx1"/>
+          </a:fontRef>
+        </p:style>
+      </p:cxnSp>
+      <p:cxnSp>
+        <p:nvCxnSpPr>
+          <p:cNvPr id="13" name="Straight Arrow Connector 12"/>
+          <p:cNvCxnSpPr/>
+          <p:nvPr/>
+        </p:nvCxnSpPr>
+        <p:spPr>
+          <a:xfrm>
+            <a:off x="5861538" y="4694511"/>
+            <a:ext cx="1230924" cy="0"/>
+          </a:xfrm>
+          <a:prstGeom prst="straightConnector1">
+            <a:avLst/>
+          </a:prstGeom>
+          <a:ln>
+            <a:tailEnd type="triangle"/>
+          </a:ln>
+        </p:spPr>
+        <p:style>
+          <a:lnRef idx="1">
+            <a:schemeClr val="accent1"/>
+          </a:lnRef>
+          <a:fillRef idx="0">
+            <a:schemeClr val="accent1"/>
+          </a:fillRef>
+          <a:effectRef idx="0">
+            <a:schemeClr val="accent1"/>
+          </a:effectRef>
+          <a:fontRef idx="minor">
+            <a:schemeClr val="tx1"/>
+          </a:fontRef>
+        </p:style>
+      </p:cxnSp>
+      <p:graphicFrame>
+        <p:nvGraphicFramePr>
+          <p:cNvPr id="14" name="Table 13"/>
+          <p:cNvGraphicFramePr>
+            <a:graphicFrameLocks noGrp="1"/>
+          </p:cNvGraphicFramePr>
+          <p:nvPr>
+            <p:extLst>
+              <p:ext uri="{D42A27DB-BD31-4B8C-83A1-F6EECF244321}">
+                <p14:modId xmlns:p14="http://schemas.microsoft.com/office/powerpoint/2010/main" val="451875300"/>
+              </p:ext>
+            </p:extLst>
+          </p:nvPr>
+        </p:nvGraphicFramePr>
+        <p:xfrm>
+          <a:off x="7387976" y="3073110"/>
+          <a:ext cx="2772024" cy="1828800"/>
+        </p:xfrm>
+        <a:graphic>
+          <a:graphicData uri="http://schemas.openxmlformats.org/drawingml/2006/table">
+            <a:tbl>
+              <a:tblPr firstRow="1" bandRow="1">
+                <a:tableStyleId>{5C22544A-7EE6-4342-B048-85BDC9FD1C3A}</a:tableStyleId>
+              </a:tblPr>
+              <a:tblGrid>
+                <a:gridCol w="2772024"/>
+              </a:tblGrid>
+              <a:tr h="354370">
+                <a:tc>
+                  <a:txBody>
+                    <a:bodyPr/>
+                    <a:lstStyle/>
+                    <a:p>
+                      <a:pPr algn="ctr"/>
+                      <a:r>
+                        <a:rPr lang="en-US" b="1" dirty="0" smtClean="0">
+                          <a:solidFill>
+                            <a:schemeClr val="tx1"/>
+                          </a:solidFill>
+                          <a:latin typeface="Andale Mono" charset="0"/>
+                          <a:ea typeface="Andale Mono" charset="0"/>
+                          <a:cs typeface="Andale Mono" charset="0"/>
+                        </a:rPr>
+                        <a:t>3,162 (+30)</a:t>
+                      </a:r>
+                      <a:endParaRPr lang="en-US" b="1" dirty="0">
+                        <a:solidFill>
+                          <a:schemeClr val="tx1"/>
+                        </a:solidFill>
+                        <a:latin typeface="Andale Mono" charset="0"/>
+                        <a:ea typeface="Andale Mono" charset="0"/>
+                        <a:cs typeface="Andale Mono" charset="0"/>
+                      </a:endParaRPr>
+                    </a:p>
+                  </a:txBody>
+                  <a:tcPr>
+                    <a:noFill/>
+                  </a:tcPr>
+                </a:tc>
+              </a:tr>
+              <a:tr h="354370">
+                <a:tc>
+                  <a:txBody>
+                    <a:bodyPr/>
+                    <a:lstStyle/>
+                    <a:p>
+                      <a:pPr algn="ctr"/>
+                      <a:r>
+                        <a:rPr lang="en-US" b="1" dirty="0" smtClean="0">
+                          <a:solidFill>
+                            <a:schemeClr val="tx1"/>
+                          </a:solidFill>
+                          <a:latin typeface="Andale Mono" charset="0"/>
+                          <a:ea typeface="Andale Mono" charset="0"/>
+                          <a:cs typeface="Andale Mono" charset="0"/>
+                        </a:rPr>
+                        <a:t>2,696 (+96)</a:t>
+                      </a:r>
+                      <a:endParaRPr lang="en-US" b="1" dirty="0">
+                        <a:solidFill>
+                          <a:schemeClr val="tx1"/>
+                        </a:solidFill>
+                        <a:latin typeface="Andale Mono" charset="0"/>
+                        <a:ea typeface="Andale Mono" charset="0"/>
+                        <a:cs typeface="Andale Mono" charset="0"/>
+                      </a:endParaRPr>
+                    </a:p>
+                  </a:txBody>
+                  <a:tcPr>
+                    <a:noFill/>
+                  </a:tcPr>
+                </a:tc>
+              </a:tr>
+              <a:tr h="354370">
+                <a:tc>
+                  <a:txBody>
+                    <a:bodyPr/>
+                    <a:lstStyle/>
+                    <a:p>
+                      <a:pPr algn="ctr"/>
+                      <a:r>
+                        <a:rPr lang="en-US" b="1" dirty="0" smtClean="0">
+                          <a:solidFill>
+                            <a:schemeClr val="tx1"/>
+                          </a:solidFill>
+                          <a:latin typeface="Andale Mono" charset="0"/>
+                          <a:ea typeface="Andale Mono" charset="0"/>
+                          <a:cs typeface="Andale Mono" charset="0"/>
+                        </a:rPr>
+                        <a:t>2,643 (+88)</a:t>
+                      </a:r>
+                      <a:endParaRPr lang="en-US" b="1" dirty="0">
+                        <a:solidFill>
+                          <a:schemeClr val="tx1"/>
+                        </a:solidFill>
+                        <a:latin typeface="Andale Mono" charset="0"/>
+                        <a:ea typeface="Andale Mono" charset="0"/>
+                        <a:cs typeface="Andale Mono" charset="0"/>
+                      </a:endParaRPr>
+                    </a:p>
+                  </a:txBody>
+                  <a:tcPr>
+                    <a:noFill/>
+                  </a:tcPr>
+                </a:tc>
+              </a:tr>
+              <a:tr h="354370">
+                <a:tc>
+                  <a:txBody>
+                    <a:bodyPr/>
+                    <a:lstStyle/>
+                    <a:p>
+                      <a:pPr algn="ctr"/>
+                      <a:r>
+                        <a:rPr lang="en-US" b="1" dirty="0" smtClean="0">
+                          <a:solidFill>
+                            <a:schemeClr val="tx1"/>
+                          </a:solidFill>
+                          <a:latin typeface="Andale Mono" charset="0"/>
+                          <a:ea typeface="Andale Mono" charset="0"/>
+                          <a:cs typeface="Andale Mono" charset="0"/>
+                        </a:rPr>
+                        <a:t>2,437 (+143)</a:t>
+                      </a:r>
+                      <a:endParaRPr lang="en-US" b="1" dirty="0">
+                        <a:solidFill>
+                          <a:schemeClr val="tx1"/>
+                        </a:solidFill>
+                        <a:latin typeface="Andale Mono" charset="0"/>
+                        <a:ea typeface="Andale Mono" charset="0"/>
+                        <a:cs typeface="Andale Mono" charset="0"/>
+                      </a:endParaRPr>
+                    </a:p>
+                  </a:txBody>
+                  <a:tcPr>
+                    <a:noFill/>
+                  </a:tcPr>
+                </a:tc>
+              </a:tr>
+              <a:tr h="354370">
+                <a:tc>
+                  <a:txBody>
+                    <a:bodyPr/>
+                    <a:lstStyle/>
+                    <a:p>
+                      <a:pPr algn="ctr"/>
+                      <a:r>
+                        <a:rPr lang="en-US" b="1" dirty="0" smtClean="0">
+                          <a:solidFill>
+                            <a:schemeClr val="tx1"/>
+                          </a:solidFill>
+                          <a:latin typeface="Andale Mono" charset="0"/>
+                          <a:ea typeface="Andale Mono" charset="0"/>
+                          <a:cs typeface="Andale Mono" charset="0"/>
+                        </a:rPr>
+                        <a:t>2,264 (+91)</a:t>
+                      </a:r>
+                      <a:endParaRPr lang="en-US" b="1" dirty="0">
+                        <a:solidFill>
+                          <a:schemeClr val="tx1"/>
+                        </a:solidFill>
+                        <a:latin typeface="Andale Mono" charset="0"/>
+                        <a:ea typeface="Andale Mono" charset="0"/>
+                        <a:cs typeface="Andale Mono" charset="0"/>
+                      </a:endParaRPr>
+                    </a:p>
+                  </a:txBody>
+                  <a:tcPr>
+                    <a:noFill/>
+                  </a:tcPr>
+                </a:tc>
+              </a:tr>
+            </a:tbl>
+          </a:graphicData>
+        </a:graphic>
+      </p:graphicFrame>
+      <p:sp>
+        <p:nvSpPr>
+          <p:cNvPr id="15" name="Rounded Rectangular Callout 14"/>
+          <p:cNvSpPr/>
+          <p:nvPr/>
+        </p:nvSpPr>
+        <p:spPr>
+          <a:xfrm>
+            <a:off x="6570784" y="351514"/>
+            <a:ext cx="4618892" cy="1055576"/>
+          </a:xfrm>
+          <a:prstGeom prst="wedgeRoundRectCallout">
+            <a:avLst>
+              <a:gd name="adj1" fmla="val -23678"/>
+              <a:gd name="adj2" fmla="val 45062"/>
+              <a:gd name="adj3" fmla="val 16667"/>
+            </a:avLst>
+          </a:prstGeom>
+          <a:solidFill>
+            <a:schemeClr val="accent2">
+              <a:lumMod val="20000"/>
+              <a:lumOff val="80000"/>
+            </a:schemeClr>
+          </a:solidFill>
+        </p:spPr>
+        <p:style>
+          <a:lnRef idx="2">
+            <a:schemeClr val="accent1">
+              <a:shade val="50000"/>
+            </a:schemeClr>
+          </a:lnRef>
+          <a:fillRef idx="1">
+            <a:schemeClr val="accent1"/>
+          </a:fillRef>
+          <a:effectRef idx="0">
+            <a:schemeClr val="accent1"/>
+          </a:effectRef>
+          <a:fontRef idx="minor">
+            <a:schemeClr val="lt1"/>
+          </a:fontRef>
+        </p:style>
+        <p:txBody>
+          <a:bodyPr rtlCol="0" anchor="ctr"/>
+          <a:lstStyle/>
+          <a:p>
+            <a:pPr algn="ctr">
+              <a:spcAft>
+                <a:spcPts val="600"/>
+              </a:spcAft>
+            </a:pPr>
+            <a:r>
+              <a:rPr lang="en-US" sz="1200" dirty="0" smtClean="0">
+                <a:solidFill>
+                  <a:schemeClr val="tx1"/>
+                </a:solidFill>
+              </a:rPr>
+              <a:t>In the original data set, ~11% of elevators did not have Zip code data</a:t>
+            </a:r>
+          </a:p>
+          <a:p>
+            <a:pPr algn="ctr">
+              <a:spcAft>
+                <a:spcPts val="600"/>
+              </a:spcAft>
+            </a:pPr>
+            <a:r>
+              <a:rPr lang="en-US" sz="1200" dirty="0" smtClean="0">
+                <a:solidFill>
+                  <a:schemeClr val="tx1"/>
+                </a:solidFill>
+              </a:rPr>
+              <a:t>Using geocoding, I used geolocation (</a:t>
+            </a:r>
+            <a:r>
+              <a:rPr lang="en-US" sz="1200" dirty="0" err="1" smtClean="0">
+                <a:solidFill>
+                  <a:schemeClr val="tx1"/>
+                </a:solidFill>
+              </a:rPr>
+              <a:t>lat</a:t>
+            </a:r>
+            <a:r>
+              <a:rPr lang="en-US" sz="1200" dirty="0" smtClean="0">
+                <a:solidFill>
+                  <a:schemeClr val="tx1"/>
+                </a:solidFill>
+              </a:rPr>
+              <a:t>/longitude) to return Zip code vales that made most of this data usable</a:t>
+            </a:r>
+          </a:p>
+          <a:p>
+            <a:pPr algn="ctr">
+              <a:spcAft>
+                <a:spcPts val="600"/>
+              </a:spcAft>
+            </a:pPr>
+            <a:r>
+              <a:rPr lang="en-US" sz="1200" dirty="0" smtClean="0">
+                <a:solidFill>
+                  <a:schemeClr val="tx1"/>
+                </a:solidFill>
+              </a:rPr>
+              <a:t>~0.2% of dataset (165 elevators) remained unresolvable as their geolocation was inconclusive</a:t>
+            </a:r>
+            <a:endParaRPr lang="en-US" sz="1200" dirty="0">
+              <a:solidFill>
+                <a:schemeClr val="tx1"/>
+              </a:solidFill>
+            </a:endParaRPr>
+          </a:p>
+        </p:txBody>
+      </p:sp>
+    </p:spTree>
+    <p:extLst>
+      <p:ext uri="{BB962C8B-B14F-4D97-AF65-F5344CB8AC3E}">
+        <p14:creationId xmlns:p14="http://schemas.microsoft.com/office/powerpoint/2010/main" val="2045588935"/>
+      </p:ext>
+    </p:extLst>
+  </p:cSld>
+  <p:clrMapOvr>
+    <a:masterClrMapping/>
+  </p:clrMapOvr>
+  <p:timing>
+    <p:tnLst>
+      <p:par>
+        <p:cTn id="1" dur="indefinite" restart="never" nodeType="tmRoot"/>
+      </p:par>
+    </p:tnLst>
+  </p:timing>
+</p:sld>
+</file>
+
+<file path=ppt/slides/slide6.xml><?xml version="1.0" encoding="utf-8"?>
+<p:sld xmlns:a="http://schemas.openxmlformats.org/drawingml/2006/main" xmlns:r="http://schemas.openxmlformats.org/officeDocument/2006/relationships" xmlns:p="http://schemas.openxmlformats.org/presentationml/2006/main">
+  <p:cSld>
+    <p:spTree>
+      <p:nvGrpSpPr>
+        <p:cNvPr id="1" name=""/>
+        <p:cNvGrpSpPr/>
+        <p:nvPr/>
+      </p:nvGrpSpPr>
+      <p:grpSpPr>
+        <a:xfrm>
+          <a:off x="0" y="0"/>
+          <a:ext cx="0" cy="0"/>
+          <a:chOff x="0" y="0"/>
+          <a:chExt cx="0" cy="0"/>
+        </a:xfrm>
+      </p:grpSpPr>
       <p:sp>
         <p:nvSpPr>
           <p:cNvPr id="2" name="TextBox 1"/>
@@ -5479,14 +6342,14 @@
           <p:nvPr>
             <p:extLst>
               <p:ext uri="{D42A27DB-BD31-4B8C-83A1-F6EECF244321}">
-                <p14:modId xmlns:p14="http://schemas.microsoft.com/office/powerpoint/2010/main" val="1748771387"/>
+                <p14:modId xmlns:p14="http://schemas.microsoft.com/office/powerpoint/2010/main" val="1608183934"/>
               </p:ext>
             </p:extLst>
           </p:nvPr>
         </p:nvGraphicFramePr>
         <p:xfrm>
           <a:off x="586156" y="1023257"/>
-          <a:ext cx="10644554" cy="4592098"/>
+          <a:ext cx="10644554" cy="4158266"/>
         </p:xfrm>
         <a:graphic>
           <a:graphicData uri="http://schemas.openxmlformats.org/drawingml/2006/chart">
@@ -5503,13 +6366,13 @@
           <p:nvPr>
             <p:extLst>
               <p:ext uri="{D42A27DB-BD31-4B8C-83A1-F6EECF244321}">
-                <p14:modId xmlns:p14="http://schemas.microsoft.com/office/powerpoint/2010/main" val="1927245003"/>
+                <p14:modId xmlns:p14="http://schemas.microsoft.com/office/powerpoint/2010/main" val="569664700"/>
               </p:ext>
             </p:extLst>
           </p:nvPr>
         </p:nvGraphicFramePr>
         <p:xfrm>
-          <a:off x="1082431" y="5429935"/>
+          <a:off x="1082431" y="5572815"/>
           <a:ext cx="9948980" cy="370840"/>
         </p:xfrm>
         <a:graphic>
@@ -5939,8 +6802,8 @@
           </a:xfrm>
           <a:prstGeom prst="wedgeRoundRectCallout">
             <a:avLst>
-              <a:gd name="adj1" fmla="val 10330"/>
-              <a:gd name="adj2" fmla="val 111024"/>
+              <a:gd name="adj1" fmla="val -3486"/>
+              <a:gd name="adj2" fmla="val 39930"/>
               <a:gd name="adj3" fmla="val 16667"/>
             </a:avLst>
           </a:prstGeom>
@@ -6004,6 +6867,338 @@
           </a:p>
         </p:txBody>
       </p:sp>
+      <p:graphicFrame>
+        <p:nvGraphicFramePr>
+          <p:cNvPr id="9" name="Table 8"/>
+          <p:cNvGraphicFramePr>
+            <a:graphicFrameLocks noGrp="1"/>
+          </p:cNvGraphicFramePr>
+          <p:nvPr>
+            <p:extLst>
+              <p:ext uri="{D42A27DB-BD31-4B8C-83A1-F6EECF244321}">
+                <p14:modId xmlns:p14="http://schemas.microsoft.com/office/powerpoint/2010/main" val="1325049283"/>
+              </p:ext>
+            </p:extLst>
+          </p:nvPr>
+        </p:nvGraphicFramePr>
+        <p:xfrm>
+          <a:off x="1082431" y="5006329"/>
+          <a:ext cx="9948980" cy="370840"/>
+        </p:xfrm>
+        <a:graphic>
+          <a:graphicData uri="http://schemas.openxmlformats.org/drawingml/2006/table">
+            <a:tbl>
+              <a:tblPr firstRow="1" bandRow="1">
+                <a:tableStyleId>{5C22544A-7EE6-4342-B048-85BDC9FD1C3A}</a:tableStyleId>
+              </a:tblPr>
+              <a:tblGrid>
+                <a:gridCol w="994898"/>
+                <a:gridCol w="994898"/>
+                <a:gridCol w="994898"/>
+                <a:gridCol w="994898"/>
+                <a:gridCol w="994898"/>
+                <a:gridCol w="994898"/>
+                <a:gridCol w="994898"/>
+                <a:gridCol w="994898"/>
+                <a:gridCol w="994898"/>
+                <a:gridCol w="994898"/>
+              </a:tblGrid>
+              <a:tr h="370840">
+                <a:tc>
+                  <a:txBody>
+                    <a:bodyPr/>
+                    <a:lstStyle/>
+                    <a:p>
+                      <a:pPr algn="ctr"/>
+                      <a:r>
+                        <a:rPr lang="en-US" sz="1100" b="0" dirty="0" smtClean="0">
+                          <a:solidFill>
+                            <a:schemeClr val="tx1"/>
+                          </a:solidFill>
+                        </a:rPr>
+                        <a:t>Manhattan</a:t>
+                      </a:r>
+                      <a:endParaRPr lang="en-US" sz="1100" b="0" dirty="0">
+                        <a:solidFill>
+                          <a:schemeClr val="tx1"/>
+                        </a:solidFill>
+                      </a:endParaRPr>
+                    </a:p>
+                  </a:txBody>
+                  <a:tcPr anchor="ctr">
+                    <a:solidFill>
+                      <a:schemeClr val="bg1">
+                        <a:lumMod val="95000"/>
+                      </a:schemeClr>
+                    </a:solidFill>
+                  </a:tcPr>
+                </a:tc>
+                <a:tc>
+                  <a:txBody>
+                    <a:bodyPr/>
+                    <a:lstStyle/>
+                    <a:p>
+                      <a:pPr algn="ctr"/>
+                      <a:r>
+                        <a:rPr lang="en-US" sz="1100" b="0" dirty="0" smtClean="0">
+                          <a:solidFill>
+                            <a:schemeClr val="tx1"/>
+                          </a:solidFill>
+                        </a:rPr>
+                        <a:t>Manhattan</a:t>
+                      </a:r>
+                      <a:endParaRPr lang="en-US" sz="1100" b="0" dirty="0">
+                        <a:solidFill>
+                          <a:schemeClr val="tx1"/>
+                        </a:solidFill>
+                      </a:endParaRPr>
+                    </a:p>
+                  </a:txBody>
+                  <a:tcPr anchor="ctr">
+                    <a:solidFill>
+                      <a:schemeClr val="bg1">
+                        <a:lumMod val="95000"/>
+                      </a:schemeClr>
+                    </a:solidFill>
+                  </a:tcPr>
+                </a:tc>
+                <a:tc>
+                  <a:txBody>
+                    <a:bodyPr/>
+                    <a:lstStyle/>
+                    <a:p>
+                      <a:pPr algn="ctr"/>
+                      <a:r>
+                        <a:rPr lang="en-US" sz="1100" b="0" dirty="0" smtClean="0">
+                          <a:solidFill>
+                            <a:schemeClr val="tx1"/>
+                          </a:solidFill>
+                        </a:rPr>
+                        <a:t>Manhattan</a:t>
+                      </a:r>
+                      <a:endParaRPr lang="en-US" sz="1100" b="0" dirty="0">
+                        <a:solidFill>
+                          <a:schemeClr val="tx1"/>
+                        </a:solidFill>
+                      </a:endParaRPr>
+                    </a:p>
+                  </a:txBody>
+                  <a:tcPr anchor="ctr">
+                    <a:solidFill>
+                      <a:schemeClr val="bg1">
+                        <a:lumMod val="95000"/>
+                      </a:schemeClr>
+                    </a:solidFill>
+                  </a:tcPr>
+                </a:tc>
+                <a:tc>
+                  <a:txBody>
+                    <a:bodyPr/>
+                    <a:lstStyle/>
+                    <a:p>
+                      <a:pPr algn="ctr"/>
+                      <a:r>
+                        <a:rPr lang="en-US" sz="1100" b="0" dirty="0" smtClean="0">
+                          <a:solidFill>
+                            <a:schemeClr val="tx1"/>
+                          </a:solidFill>
+                        </a:rPr>
+                        <a:t>Manhattan</a:t>
+                      </a:r>
+                      <a:endParaRPr lang="en-US" sz="1100" b="0" dirty="0">
+                        <a:solidFill>
+                          <a:schemeClr val="tx1"/>
+                        </a:solidFill>
+                      </a:endParaRPr>
+                    </a:p>
+                  </a:txBody>
+                  <a:tcPr anchor="ctr">
+                    <a:solidFill>
+                      <a:schemeClr val="bg1">
+                        <a:lumMod val="95000"/>
+                      </a:schemeClr>
+                    </a:solidFill>
+                  </a:tcPr>
+                </a:tc>
+                <a:tc>
+                  <a:txBody>
+                    <a:bodyPr/>
+                    <a:lstStyle/>
+                    <a:p>
+                      <a:pPr algn="ctr"/>
+                      <a:r>
+                        <a:rPr lang="en-US" sz="1100" b="0" dirty="0" smtClean="0">
+                          <a:solidFill>
+                            <a:schemeClr val="tx1"/>
+                          </a:solidFill>
+                        </a:rPr>
+                        <a:t>Brooklyn</a:t>
+                      </a:r>
+                      <a:endParaRPr lang="en-US" sz="1100" b="0" dirty="0">
+                        <a:solidFill>
+                          <a:schemeClr val="tx1"/>
+                        </a:solidFill>
+                      </a:endParaRPr>
+                    </a:p>
+                  </a:txBody>
+                  <a:tcPr anchor="ctr">
+                    <a:solidFill>
+                      <a:schemeClr val="bg1">
+                        <a:lumMod val="95000"/>
+                      </a:schemeClr>
+                    </a:solidFill>
+                  </a:tcPr>
+                </a:tc>
+                <a:tc>
+                  <a:txBody>
+                    <a:bodyPr/>
+                    <a:lstStyle/>
+                    <a:p>
+                      <a:pPr algn="ctr"/>
+                      <a:r>
+                        <a:rPr lang="en-US" sz="1100" b="0" dirty="0" smtClean="0">
+                          <a:solidFill>
+                            <a:schemeClr val="tx1"/>
+                          </a:solidFill>
+                        </a:rPr>
+                        <a:t>Manhattan</a:t>
+                      </a:r>
+                      <a:endParaRPr lang="en-US" sz="1100" b="0" dirty="0">
+                        <a:solidFill>
+                          <a:schemeClr val="tx1"/>
+                        </a:solidFill>
+                      </a:endParaRPr>
+                    </a:p>
+                  </a:txBody>
+                  <a:tcPr anchor="ctr">
+                    <a:solidFill>
+                      <a:schemeClr val="bg1">
+                        <a:lumMod val="95000"/>
+                      </a:schemeClr>
+                    </a:solidFill>
+                  </a:tcPr>
+                </a:tc>
+                <a:tc>
+                  <a:txBody>
+                    <a:bodyPr/>
+                    <a:lstStyle/>
+                    <a:p>
+                      <a:pPr algn="ctr"/>
+                      <a:r>
+                        <a:rPr lang="en-US" sz="1100" b="0" dirty="0" smtClean="0">
+                          <a:solidFill>
+                            <a:schemeClr val="tx1"/>
+                          </a:solidFill>
+                        </a:rPr>
+                        <a:t>Manhattan</a:t>
+                      </a:r>
+                      <a:endParaRPr lang="en-US" sz="1100" b="0" dirty="0">
+                        <a:solidFill>
+                          <a:schemeClr val="tx1"/>
+                        </a:solidFill>
+                      </a:endParaRPr>
+                    </a:p>
+                  </a:txBody>
+                  <a:tcPr anchor="ctr">
+                    <a:solidFill>
+                      <a:schemeClr val="bg1">
+                        <a:lumMod val="95000"/>
+                      </a:schemeClr>
+                    </a:solidFill>
+                  </a:tcPr>
+                </a:tc>
+                <a:tc>
+                  <a:txBody>
+                    <a:bodyPr/>
+                    <a:lstStyle/>
+                    <a:p>
+                      <a:pPr algn="ctr"/>
+                      <a:r>
+                        <a:rPr lang="en-US" sz="1100" b="0" dirty="0" smtClean="0">
+                          <a:solidFill>
+                            <a:schemeClr val="tx1"/>
+                          </a:solidFill>
+                        </a:rPr>
+                        <a:t>Queens</a:t>
+                      </a:r>
+                      <a:endParaRPr lang="en-US" sz="1100" b="0" dirty="0">
+                        <a:solidFill>
+                          <a:schemeClr val="tx1"/>
+                        </a:solidFill>
+                      </a:endParaRPr>
+                    </a:p>
+                  </a:txBody>
+                  <a:tcPr anchor="ctr">
+                    <a:solidFill>
+                      <a:schemeClr val="bg1">
+                        <a:lumMod val="95000"/>
+                      </a:schemeClr>
+                    </a:solidFill>
+                  </a:tcPr>
+                </a:tc>
+                <a:tc>
+                  <a:txBody>
+                    <a:bodyPr/>
+                    <a:lstStyle/>
+                    <a:p>
+                      <a:pPr algn="ctr"/>
+                      <a:r>
+                        <a:rPr lang="en-US" sz="1100" b="0" dirty="0" smtClean="0">
+                          <a:solidFill>
+                            <a:schemeClr val="tx1"/>
+                          </a:solidFill>
+                        </a:rPr>
+                        <a:t>Staten Island</a:t>
+                      </a:r>
+                      <a:endParaRPr lang="en-US" sz="1100" b="0" dirty="0">
+                        <a:solidFill>
+                          <a:schemeClr val="tx1"/>
+                        </a:solidFill>
+                      </a:endParaRPr>
+                    </a:p>
+                  </a:txBody>
+                  <a:tcPr anchor="ctr">
+                    <a:solidFill>
+                      <a:schemeClr val="bg1">
+                        <a:lumMod val="95000"/>
+                      </a:schemeClr>
+                    </a:solidFill>
+                  </a:tcPr>
+                </a:tc>
+                <a:tc>
+                  <a:txBody>
+                    <a:bodyPr/>
+                    <a:lstStyle/>
+                    <a:p>
+                      <a:pPr algn="ctr"/>
+                      <a:r>
+                        <a:rPr lang="en-US" sz="1100" b="0" dirty="0" smtClean="0">
+                          <a:solidFill>
+                            <a:schemeClr val="tx1"/>
+                          </a:solidFill>
+                        </a:rPr>
+                        <a:t>Bronx</a:t>
+                      </a:r>
+                      <a:endParaRPr lang="en-US" sz="1100" b="0" dirty="0">
+                        <a:solidFill>
+                          <a:schemeClr val="tx1"/>
+                        </a:solidFill>
+                      </a:endParaRPr>
+                    </a:p>
+                  </a:txBody>
+                  <a:tcPr anchor="ctr">
+                    <a:solidFill>
+                      <a:schemeClr val="bg1">
+                        <a:lumMod val="95000"/>
+                      </a:schemeClr>
+                    </a:solidFill>
+                  </a:tcPr>
+                </a:tc>
+              </a:tr>
+            </a:tbl>
+          </a:graphicData>
+        </a:graphic>
+      </p:graphicFrame>
     </p:spTree>
     <p:extLst>
       <p:ext uri="{BB962C8B-B14F-4D97-AF65-F5344CB8AC3E}">
@@ -6024,7 +7219,7 @@
 </p:sld>
 </file>
 
-<file path=ppt/slides/slide6.xml><?xml version="1.0" encoding="utf-8"?>
+<file path=ppt/slides/slide7.xml><?xml version="1.0" encoding="utf-8"?>
 <p:sld xmlns:a="http://schemas.openxmlformats.org/drawingml/2006/main" xmlns:r="http://schemas.openxmlformats.org/officeDocument/2006/relationships" xmlns:p="http://schemas.openxmlformats.org/presentationml/2006/main">
   <p:cSld>
     <p:spTree>
@@ -7293,7 +8488,7 @@
 </p:sld>
 </file>
 
-<file path=ppt/slides/slide7.xml><?xml version="1.0" encoding="utf-8"?>
+<file path=ppt/slides/slide8.xml><?xml version="1.0" encoding="utf-8"?>
 <p:sld xmlns:a="http://schemas.openxmlformats.org/drawingml/2006/main" xmlns:r="http://schemas.openxmlformats.org/officeDocument/2006/relationships" xmlns:p="http://schemas.openxmlformats.org/presentationml/2006/main">
   <p:cSld>
     <p:spTree>
@@ -7334,15 +8529,7 @@
           <a:p>
             <a:r>
               <a:rPr lang="en-US" sz="2400" dirty="0" smtClean="0"/>
-              <a:t>Which type of elevator best predicts </a:t>
-            </a:r>
-            <a:r>
-              <a:rPr lang="en-US" sz="2400" dirty="0" smtClean="0"/>
-              <a:t>neighborhood prosperity</a:t>
-            </a:r>
-            <a:r>
-              <a:rPr lang="en-US" sz="2400" dirty="0" smtClean="0"/>
-              <a:t>?</a:t>
+              <a:t>Which type of elevator best predicts neighborhood prosperity?</a:t>
             </a:r>
             <a:endParaRPr lang="en-US" sz="2400" dirty="0"/>
           </a:p>
@@ -7917,15 +9104,7 @@
                   <a:schemeClr val="tx1"/>
                 </a:solidFill>
               </a:rPr>
-              <a:t>Best </a:t>
-            </a:r>
-            <a:r>
-              <a:rPr lang="en-US" sz="1200" b="1" dirty="0" smtClean="0">
-                <a:solidFill>
-                  <a:schemeClr val="tx1"/>
-                </a:solidFill>
-              </a:rPr>
-              <a:t>predictors </a:t>
+              <a:t>Best predictors </a:t>
             </a:r>
             <a:r>
               <a:rPr lang="en-US" sz="1200" dirty="0" smtClean="0">
@@ -7933,15 +9112,7 @@
                   <a:schemeClr val="tx1"/>
                 </a:solidFill>
               </a:rPr>
-              <a:t>of </a:t>
-            </a:r>
-            <a:r>
-              <a:rPr lang="en-US" sz="1200" dirty="0" smtClean="0">
-                <a:solidFill>
-                  <a:schemeClr val="tx1"/>
-                </a:solidFill>
-              </a:rPr>
-              <a:t>neighborhood prosperity </a:t>
+              <a:t>of neighborhood prosperity </a:t>
             </a:r>
             <a:r>
               <a:rPr lang="mr-IN" sz="1200" dirty="0" smtClean="0">
@@ -7957,31 +9128,7 @@
                   <a:schemeClr val="tx1"/>
                 </a:solidFill>
               </a:rPr>
-              <a:t> given well-off neighborhoods have </a:t>
-            </a:r>
-            <a:r>
-              <a:rPr lang="en-US" sz="1200" dirty="0" smtClean="0">
-                <a:solidFill>
-                  <a:schemeClr val="tx1"/>
-                </a:solidFill>
-              </a:rPr>
-              <a:t>retail/office spaces, commercial </a:t>
-            </a:r>
-            <a:r>
-              <a:rPr lang="en-US" sz="1200" dirty="0" smtClean="0">
-                <a:solidFill>
-                  <a:schemeClr val="tx1"/>
-                </a:solidFill>
-              </a:rPr>
-              <a:t>and condo atriums that typically have an </a:t>
-            </a:r>
-            <a:r>
-              <a:rPr lang="en-US" sz="1200" dirty="0" smtClean="0">
-                <a:solidFill>
-                  <a:schemeClr val="tx1"/>
-                </a:solidFill>
-              </a:rPr>
-              <a:t>escalator and freight elevators!</a:t>
+              <a:t> given well-off neighborhoods have retail/office spaces, commercial and condo atriums that typically have an escalator and freight elevators!</a:t>
             </a:r>
             <a:endParaRPr lang="en-US" sz="1200" dirty="0">
               <a:solidFill>
@@ -8008,826 +9155,6 @@
       </p:par>
     </p:tnLst>
   </p:timing>
-</p:sld>
-</file>
-
-<file path=ppt/slides/slide8.xml><?xml version="1.0" encoding="utf-8"?>
-<p:sld xmlns:a="http://schemas.openxmlformats.org/drawingml/2006/main" xmlns:r="http://schemas.openxmlformats.org/officeDocument/2006/relationships" xmlns:p="http://schemas.openxmlformats.org/presentationml/2006/main">
-  <p:cSld>
-    <p:spTree>
-      <p:nvGrpSpPr>
-        <p:cNvPr id="1" name=""/>
-        <p:cNvGrpSpPr/>
-        <p:nvPr/>
-      </p:nvGrpSpPr>
-      <p:grpSpPr>
-        <a:xfrm>
-          <a:off x="0" y="0"/>
-          <a:ext cx="0" cy="0"/>
-          <a:chOff x="0" y="0"/>
-          <a:chExt cx="0" cy="0"/>
-        </a:xfrm>
-      </p:grpSpPr>
-      <p:pic>
-        <p:nvPicPr>
-          <p:cNvPr id="3" name="Picture 2"/>
-          <p:cNvPicPr>
-            <a:picLocks noChangeAspect="1"/>
-          </p:cNvPicPr>
-          <p:nvPr/>
-        </p:nvPicPr>
-        <p:blipFill rotWithShape="1">
-          <a:blip r:embed="rId2"/>
-          <a:srcRect l="3501" t="21382" r="79390" b="55850"/>
-          <a:stretch/>
-        </p:blipFill>
-        <p:spPr>
-          <a:xfrm>
-            <a:off x="1383322" y="2051539"/>
-            <a:ext cx="4407877" cy="3299464"/>
-          </a:xfrm>
-          <a:prstGeom prst="rect">
-            <a:avLst/>
-          </a:prstGeom>
-        </p:spPr>
-      </p:pic>
-      <p:sp>
-        <p:nvSpPr>
-          <p:cNvPr id="5" name="TextBox 4"/>
-          <p:cNvSpPr txBox="1"/>
-          <p:nvPr/>
-        </p:nvSpPr>
-        <p:spPr>
-          <a:xfrm>
-            <a:off x="281354" y="120682"/>
-            <a:ext cx="4681090" cy="461665"/>
-          </a:xfrm>
-          <a:prstGeom prst="rect">
-            <a:avLst/>
-          </a:prstGeom>
-          <a:noFill/>
-        </p:spPr>
-        <p:txBody>
-          <a:bodyPr wrap="none" rtlCol="0">
-            <a:spAutoFit/>
-          </a:bodyPr>
-          <a:lstStyle/>
-          <a:p>
-            <a:r>
-              <a:rPr lang="en-US" sz="2400" dirty="0" smtClean="0"/>
-              <a:t>Updates to </a:t>
-            </a:r>
-            <a:r>
-              <a:rPr lang="en-US" sz="2400" dirty="0" err="1" smtClean="0"/>
-              <a:t>FiveThirtyEight</a:t>
-            </a:r>
-            <a:r>
-              <a:rPr lang="en-US" sz="2400" dirty="0" smtClean="0"/>
-              <a:t> analysis</a:t>
-            </a:r>
-            <a:endParaRPr lang="en-US" sz="2400" dirty="0"/>
-          </a:p>
-        </p:txBody>
-      </p:sp>
-      <p:sp>
-        <p:nvSpPr>
-          <p:cNvPr id="6" name="TextBox 5"/>
-          <p:cNvSpPr txBox="1"/>
-          <p:nvPr/>
-        </p:nvSpPr>
-        <p:spPr>
-          <a:xfrm>
-            <a:off x="1854683" y="1660513"/>
-            <a:ext cx="3780202" cy="338554"/>
-          </a:xfrm>
-          <a:prstGeom prst="rect">
-            <a:avLst/>
-          </a:prstGeom>
-          <a:noFill/>
-        </p:spPr>
-        <p:txBody>
-          <a:bodyPr wrap="none" rtlCol="0">
-            <a:spAutoFit/>
-          </a:bodyPr>
-          <a:lstStyle>
-            <a:defPPr>
-              <a:defRPr lang="en-US"/>
-            </a:defPPr>
-            <a:lvl1pPr marL="0" algn="l" defTabSz="457200" rtl="0" eaLnBrk="1" latinLnBrk="0" hangingPunct="1">
-              <a:defRPr sz="1800" kern="1200">
-                <a:solidFill>
-                  <a:schemeClr val="tx1"/>
-                </a:solidFill>
-                <a:latin typeface="+mn-lt"/>
-                <a:ea typeface="+mn-ea"/>
-                <a:cs typeface="+mn-cs"/>
-              </a:defRPr>
-            </a:lvl1pPr>
-            <a:lvl2pPr marL="457200" algn="l" defTabSz="457200" rtl="0" eaLnBrk="1" latinLnBrk="0" hangingPunct="1">
-              <a:defRPr sz="1800" kern="1200">
-                <a:solidFill>
-                  <a:schemeClr val="tx1"/>
-                </a:solidFill>
-                <a:latin typeface="+mn-lt"/>
-                <a:ea typeface="+mn-ea"/>
-                <a:cs typeface="+mn-cs"/>
-              </a:defRPr>
-            </a:lvl2pPr>
-            <a:lvl3pPr marL="914400" algn="l" defTabSz="457200" rtl="0" eaLnBrk="1" latinLnBrk="0" hangingPunct="1">
-              <a:defRPr sz="1800" kern="1200">
-                <a:solidFill>
-                  <a:schemeClr val="tx1"/>
-                </a:solidFill>
-                <a:latin typeface="+mn-lt"/>
-                <a:ea typeface="+mn-ea"/>
-                <a:cs typeface="+mn-cs"/>
-              </a:defRPr>
-            </a:lvl3pPr>
-            <a:lvl4pPr marL="1371600" algn="l" defTabSz="457200" rtl="0" eaLnBrk="1" latinLnBrk="0" hangingPunct="1">
-              <a:defRPr sz="1800" kern="1200">
-                <a:solidFill>
-                  <a:schemeClr val="tx1"/>
-                </a:solidFill>
-                <a:latin typeface="+mn-lt"/>
-                <a:ea typeface="+mn-ea"/>
-                <a:cs typeface="+mn-cs"/>
-              </a:defRPr>
-            </a:lvl4pPr>
-            <a:lvl5pPr marL="1828800" algn="l" defTabSz="457200" rtl="0" eaLnBrk="1" latinLnBrk="0" hangingPunct="1">
-              <a:defRPr sz="1800" kern="1200">
-                <a:solidFill>
-                  <a:schemeClr val="tx1"/>
-                </a:solidFill>
-                <a:latin typeface="+mn-lt"/>
-                <a:ea typeface="+mn-ea"/>
-                <a:cs typeface="+mn-cs"/>
-              </a:defRPr>
-            </a:lvl5pPr>
-            <a:lvl6pPr marL="2286000" algn="l" defTabSz="457200" rtl="0" eaLnBrk="1" latinLnBrk="0" hangingPunct="1">
-              <a:defRPr sz="1800" kern="1200">
-                <a:solidFill>
-                  <a:schemeClr val="tx1"/>
-                </a:solidFill>
-                <a:latin typeface="+mn-lt"/>
-                <a:ea typeface="+mn-ea"/>
-                <a:cs typeface="+mn-cs"/>
-              </a:defRPr>
-            </a:lvl6pPr>
-            <a:lvl7pPr marL="2743200" algn="l" defTabSz="457200" rtl="0" eaLnBrk="1" latinLnBrk="0" hangingPunct="1">
-              <a:defRPr sz="1800" kern="1200">
-                <a:solidFill>
-                  <a:schemeClr val="tx1"/>
-                </a:solidFill>
-                <a:latin typeface="+mn-lt"/>
-                <a:ea typeface="+mn-ea"/>
-                <a:cs typeface="+mn-cs"/>
-              </a:defRPr>
-            </a:lvl7pPr>
-            <a:lvl8pPr marL="3200400" algn="l" defTabSz="457200" rtl="0" eaLnBrk="1" latinLnBrk="0" hangingPunct="1">
-              <a:defRPr sz="1800" kern="1200">
-                <a:solidFill>
-                  <a:schemeClr val="tx1"/>
-                </a:solidFill>
-                <a:latin typeface="+mn-lt"/>
-                <a:ea typeface="+mn-ea"/>
-                <a:cs typeface="+mn-cs"/>
-              </a:defRPr>
-            </a:lvl8pPr>
-            <a:lvl9pPr marL="3657600" algn="l" defTabSz="457200" rtl="0" eaLnBrk="1" latinLnBrk="0" hangingPunct="1">
-              <a:defRPr sz="1800" kern="1200">
-                <a:solidFill>
-                  <a:schemeClr val="tx1"/>
-                </a:solidFill>
-                <a:latin typeface="+mn-lt"/>
-                <a:ea typeface="+mn-ea"/>
-                <a:cs typeface="+mn-cs"/>
-              </a:defRPr>
-            </a:lvl9pPr>
-          </a:lstStyle>
-          <a:p>
-            <a:r>
-              <a:rPr lang="en-US" sz="1600" b="1" u="sng" dirty="0" smtClean="0"/>
-              <a:t>Original table from </a:t>
-            </a:r>
-            <a:r>
-              <a:rPr lang="en-US" sz="1600" b="1" u="sng" dirty="0" err="1" smtClean="0"/>
-              <a:t>FiveThirtyEight</a:t>
-            </a:r>
-            <a:r>
-              <a:rPr lang="en-US" sz="1600" b="1" u="sng" dirty="0" smtClean="0"/>
-              <a:t> story</a:t>
-            </a:r>
-            <a:endParaRPr lang="en-US" sz="1600" b="1" u="sng" dirty="0"/>
-          </a:p>
-        </p:txBody>
-      </p:sp>
-      <p:sp>
-        <p:nvSpPr>
-          <p:cNvPr id="7" name="TextBox 6"/>
-          <p:cNvSpPr txBox="1"/>
-          <p:nvPr/>
-        </p:nvSpPr>
-        <p:spPr>
-          <a:xfrm>
-            <a:off x="7387976" y="1660513"/>
-            <a:ext cx="2777492" cy="338554"/>
-          </a:xfrm>
-          <a:prstGeom prst="rect">
-            <a:avLst/>
-          </a:prstGeom>
-          <a:noFill/>
-        </p:spPr>
-        <p:txBody>
-          <a:bodyPr wrap="none" rtlCol="0">
-            <a:spAutoFit/>
-          </a:bodyPr>
-          <a:lstStyle>
-            <a:defPPr>
-              <a:defRPr lang="en-US"/>
-            </a:defPPr>
-            <a:lvl1pPr marL="0" algn="l" defTabSz="457200" rtl="0" eaLnBrk="1" latinLnBrk="0" hangingPunct="1">
-              <a:defRPr sz="1800" kern="1200">
-                <a:solidFill>
-                  <a:schemeClr val="tx1"/>
-                </a:solidFill>
-                <a:latin typeface="+mn-lt"/>
-                <a:ea typeface="+mn-ea"/>
-                <a:cs typeface="+mn-cs"/>
-              </a:defRPr>
-            </a:lvl1pPr>
-            <a:lvl2pPr marL="457200" algn="l" defTabSz="457200" rtl="0" eaLnBrk="1" latinLnBrk="0" hangingPunct="1">
-              <a:defRPr sz="1800" kern="1200">
-                <a:solidFill>
-                  <a:schemeClr val="tx1"/>
-                </a:solidFill>
-                <a:latin typeface="+mn-lt"/>
-                <a:ea typeface="+mn-ea"/>
-                <a:cs typeface="+mn-cs"/>
-              </a:defRPr>
-            </a:lvl2pPr>
-            <a:lvl3pPr marL="914400" algn="l" defTabSz="457200" rtl="0" eaLnBrk="1" latinLnBrk="0" hangingPunct="1">
-              <a:defRPr sz="1800" kern="1200">
-                <a:solidFill>
-                  <a:schemeClr val="tx1"/>
-                </a:solidFill>
-                <a:latin typeface="+mn-lt"/>
-                <a:ea typeface="+mn-ea"/>
-                <a:cs typeface="+mn-cs"/>
-              </a:defRPr>
-            </a:lvl3pPr>
-            <a:lvl4pPr marL="1371600" algn="l" defTabSz="457200" rtl="0" eaLnBrk="1" latinLnBrk="0" hangingPunct="1">
-              <a:defRPr sz="1800" kern="1200">
-                <a:solidFill>
-                  <a:schemeClr val="tx1"/>
-                </a:solidFill>
-                <a:latin typeface="+mn-lt"/>
-                <a:ea typeface="+mn-ea"/>
-                <a:cs typeface="+mn-cs"/>
-              </a:defRPr>
-            </a:lvl4pPr>
-            <a:lvl5pPr marL="1828800" algn="l" defTabSz="457200" rtl="0" eaLnBrk="1" latinLnBrk="0" hangingPunct="1">
-              <a:defRPr sz="1800" kern="1200">
-                <a:solidFill>
-                  <a:schemeClr val="tx1"/>
-                </a:solidFill>
-                <a:latin typeface="+mn-lt"/>
-                <a:ea typeface="+mn-ea"/>
-                <a:cs typeface="+mn-cs"/>
-              </a:defRPr>
-            </a:lvl5pPr>
-            <a:lvl6pPr marL="2286000" algn="l" defTabSz="457200" rtl="0" eaLnBrk="1" latinLnBrk="0" hangingPunct="1">
-              <a:defRPr sz="1800" kern="1200">
-                <a:solidFill>
-                  <a:schemeClr val="tx1"/>
-                </a:solidFill>
-                <a:latin typeface="+mn-lt"/>
-                <a:ea typeface="+mn-ea"/>
-                <a:cs typeface="+mn-cs"/>
-              </a:defRPr>
-            </a:lvl6pPr>
-            <a:lvl7pPr marL="2743200" algn="l" defTabSz="457200" rtl="0" eaLnBrk="1" latinLnBrk="0" hangingPunct="1">
-              <a:defRPr sz="1800" kern="1200">
-                <a:solidFill>
-                  <a:schemeClr val="tx1"/>
-                </a:solidFill>
-                <a:latin typeface="+mn-lt"/>
-                <a:ea typeface="+mn-ea"/>
-                <a:cs typeface="+mn-cs"/>
-              </a:defRPr>
-            </a:lvl7pPr>
-            <a:lvl8pPr marL="3200400" algn="l" defTabSz="457200" rtl="0" eaLnBrk="1" latinLnBrk="0" hangingPunct="1">
-              <a:defRPr sz="1800" kern="1200">
-                <a:solidFill>
-                  <a:schemeClr val="tx1"/>
-                </a:solidFill>
-                <a:latin typeface="+mn-lt"/>
-                <a:ea typeface="+mn-ea"/>
-                <a:cs typeface="+mn-cs"/>
-              </a:defRPr>
-            </a:lvl8pPr>
-            <a:lvl9pPr marL="3657600" algn="l" defTabSz="457200" rtl="0" eaLnBrk="1" latinLnBrk="0" hangingPunct="1">
-              <a:defRPr sz="1800" kern="1200">
-                <a:solidFill>
-                  <a:schemeClr val="tx1"/>
-                </a:solidFill>
-                <a:latin typeface="+mn-lt"/>
-                <a:ea typeface="+mn-ea"/>
-                <a:cs typeface="+mn-cs"/>
-              </a:defRPr>
-            </a:lvl9pPr>
-          </a:lstStyle>
-          <a:p>
-            <a:r>
-              <a:rPr lang="en-US" sz="1600" b="1" u="sng" dirty="0" smtClean="0"/>
-              <a:t>Updated number of elevators</a:t>
-            </a:r>
-            <a:endParaRPr lang="en-US" sz="1600" b="1" u="sng" dirty="0"/>
-          </a:p>
-        </p:txBody>
-      </p:sp>
-      <p:cxnSp>
-        <p:nvCxnSpPr>
-          <p:cNvPr id="9" name="Straight Arrow Connector 8"/>
-          <p:cNvCxnSpPr/>
-          <p:nvPr/>
-        </p:nvCxnSpPr>
-        <p:spPr>
-          <a:xfrm>
-            <a:off x="5861538" y="3305908"/>
-            <a:ext cx="1230924" cy="0"/>
-          </a:xfrm>
-          <a:prstGeom prst="straightConnector1">
-            <a:avLst/>
-          </a:prstGeom>
-          <a:ln>
-            <a:tailEnd type="triangle"/>
-          </a:ln>
-        </p:spPr>
-        <p:style>
-          <a:lnRef idx="1">
-            <a:schemeClr val="accent1"/>
-          </a:lnRef>
-          <a:fillRef idx="0">
-            <a:schemeClr val="accent1"/>
-          </a:fillRef>
-          <a:effectRef idx="0">
-            <a:schemeClr val="accent1"/>
-          </a:effectRef>
-          <a:fontRef idx="minor">
-            <a:schemeClr val="tx1"/>
-          </a:fontRef>
-        </p:style>
-      </p:cxnSp>
-      <p:cxnSp>
-        <p:nvCxnSpPr>
-          <p:cNvPr id="10" name="Straight Arrow Connector 9"/>
-          <p:cNvCxnSpPr/>
-          <p:nvPr/>
-        </p:nvCxnSpPr>
-        <p:spPr>
-          <a:xfrm>
-            <a:off x="5861538" y="3653059"/>
-            <a:ext cx="1230924" cy="0"/>
-          </a:xfrm>
-          <a:prstGeom prst="straightConnector1">
-            <a:avLst/>
-          </a:prstGeom>
-          <a:ln>
-            <a:tailEnd type="triangle"/>
-          </a:ln>
-        </p:spPr>
-        <p:style>
-          <a:lnRef idx="1">
-            <a:schemeClr val="accent1"/>
-          </a:lnRef>
-          <a:fillRef idx="0">
-            <a:schemeClr val="accent1"/>
-          </a:fillRef>
-          <a:effectRef idx="0">
-            <a:schemeClr val="accent1"/>
-          </a:effectRef>
-          <a:fontRef idx="minor">
-            <a:schemeClr val="tx1"/>
-          </a:fontRef>
-        </p:style>
-      </p:cxnSp>
-      <p:cxnSp>
-        <p:nvCxnSpPr>
-          <p:cNvPr id="11" name="Straight Arrow Connector 10"/>
-          <p:cNvCxnSpPr/>
-          <p:nvPr/>
-        </p:nvCxnSpPr>
-        <p:spPr>
-          <a:xfrm>
-            <a:off x="5861538" y="4000210"/>
-            <a:ext cx="1230924" cy="0"/>
-          </a:xfrm>
-          <a:prstGeom prst="straightConnector1">
-            <a:avLst/>
-          </a:prstGeom>
-          <a:ln>
-            <a:tailEnd type="triangle"/>
-          </a:ln>
-        </p:spPr>
-        <p:style>
-          <a:lnRef idx="1">
-            <a:schemeClr val="accent1"/>
-          </a:lnRef>
-          <a:fillRef idx="0">
-            <a:schemeClr val="accent1"/>
-          </a:fillRef>
-          <a:effectRef idx="0">
-            <a:schemeClr val="accent1"/>
-          </a:effectRef>
-          <a:fontRef idx="minor">
-            <a:schemeClr val="tx1"/>
-          </a:fontRef>
-        </p:style>
-      </p:cxnSp>
-      <p:cxnSp>
-        <p:nvCxnSpPr>
-          <p:cNvPr id="12" name="Straight Arrow Connector 11"/>
-          <p:cNvCxnSpPr/>
-          <p:nvPr/>
-        </p:nvCxnSpPr>
-        <p:spPr>
-          <a:xfrm>
-            <a:off x="5861538" y="4347361"/>
-            <a:ext cx="1230924" cy="0"/>
-          </a:xfrm>
-          <a:prstGeom prst="straightConnector1">
-            <a:avLst/>
-          </a:prstGeom>
-          <a:ln>
-            <a:tailEnd type="triangle"/>
-          </a:ln>
-        </p:spPr>
-        <p:style>
-          <a:lnRef idx="1">
-            <a:schemeClr val="accent1"/>
-          </a:lnRef>
-          <a:fillRef idx="0">
-            <a:schemeClr val="accent1"/>
-          </a:fillRef>
-          <a:effectRef idx="0">
-            <a:schemeClr val="accent1"/>
-          </a:effectRef>
-          <a:fontRef idx="minor">
-            <a:schemeClr val="tx1"/>
-          </a:fontRef>
-        </p:style>
-      </p:cxnSp>
-      <p:cxnSp>
-        <p:nvCxnSpPr>
-          <p:cNvPr id="13" name="Straight Arrow Connector 12"/>
-          <p:cNvCxnSpPr/>
-          <p:nvPr/>
-        </p:nvCxnSpPr>
-        <p:spPr>
-          <a:xfrm>
-            <a:off x="5861538" y="4694511"/>
-            <a:ext cx="1230924" cy="0"/>
-          </a:xfrm>
-          <a:prstGeom prst="straightConnector1">
-            <a:avLst/>
-          </a:prstGeom>
-          <a:ln>
-            <a:tailEnd type="triangle"/>
-          </a:ln>
-        </p:spPr>
-        <p:style>
-          <a:lnRef idx="1">
-            <a:schemeClr val="accent1"/>
-          </a:lnRef>
-          <a:fillRef idx="0">
-            <a:schemeClr val="accent1"/>
-          </a:fillRef>
-          <a:effectRef idx="0">
-            <a:schemeClr val="accent1"/>
-          </a:effectRef>
-          <a:fontRef idx="minor">
-            <a:schemeClr val="tx1"/>
-          </a:fontRef>
-        </p:style>
-      </p:cxnSp>
-      <p:graphicFrame>
-        <p:nvGraphicFramePr>
-          <p:cNvPr id="14" name="Table 13"/>
-          <p:cNvGraphicFramePr>
-            <a:graphicFrameLocks noGrp="1"/>
-          </p:cNvGraphicFramePr>
-          <p:nvPr>
-            <p:extLst>
-              <p:ext uri="{D42A27DB-BD31-4B8C-83A1-F6EECF244321}">
-                <p14:modId xmlns:p14="http://schemas.microsoft.com/office/powerpoint/2010/main" val="451875300"/>
-              </p:ext>
-            </p:extLst>
-          </p:nvPr>
-        </p:nvGraphicFramePr>
-        <p:xfrm>
-          <a:off x="7387976" y="3073110"/>
-          <a:ext cx="2772024" cy="1828800"/>
-        </p:xfrm>
-        <a:graphic>
-          <a:graphicData uri="http://schemas.openxmlformats.org/drawingml/2006/table">
-            <a:tbl>
-              <a:tblPr firstRow="1" bandRow="1">
-                <a:tableStyleId>{5C22544A-7EE6-4342-B048-85BDC9FD1C3A}</a:tableStyleId>
-              </a:tblPr>
-              <a:tblGrid>
-                <a:gridCol w="2772024"/>
-              </a:tblGrid>
-              <a:tr h="354370">
-                <a:tc>
-                  <a:txBody>
-                    <a:bodyPr/>
-                    <a:lstStyle/>
-                    <a:p>
-                      <a:pPr algn="ctr"/>
-                      <a:r>
-                        <a:rPr lang="en-US" b="1" dirty="0" smtClean="0">
-                          <a:solidFill>
-                            <a:schemeClr val="tx1"/>
-                          </a:solidFill>
-                          <a:latin typeface="Andale Mono" charset="0"/>
-                          <a:ea typeface="Andale Mono" charset="0"/>
-                          <a:cs typeface="Andale Mono" charset="0"/>
-                        </a:rPr>
-                        <a:t>3,162 (+30)</a:t>
-                      </a:r>
-                      <a:endParaRPr lang="en-US" b="1" dirty="0">
-                        <a:solidFill>
-                          <a:schemeClr val="tx1"/>
-                        </a:solidFill>
-                        <a:latin typeface="Andale Mono" charset="0"/>
-                        <a:ea typeface="Andale Mono" charset="0"/>
-                        <a:cs typeface="Andale Mono" charset="0"/>
-                      </a:endParaRPr>
-                    </a:p>
-                  </a:txBody>
-                  <a:tcPr>
-                    <a:noFill/>
-                  </a:tcPr>
-                </a:tc>
-              </a:tr>
-              <a:tr h="354370">
-                <a:tc>
-                  <a:txBody>
-                    <a:bodyPr/>
-                    <a:lstStyle/>
-                    <a:p>
-                      <a:pPr algn="ctr"/>
-                      <a:r>
-                        <a:rPr lang="en-US" b="1" dirty="0" smtClean="0">
-                          <a:solidFill>
-                            <a:schemeClr val="tx1"/>
-                          </a:solidFill>
-                          <a:latin typeface="Andale Mono" charset="0"/>
-                          <a:ea typeface="Andale Mono" charset="0"/>
-                          <a:cs typeface="Andale Mono" charset="0"/>
-                        </a:rPr>
-                        <a:t>2,696 (+96)</a:t>
-                      </a:r>
-                      <a:endParaRPr lang="en-US" b="1" dirty="0">
-                        <a:solidFill>
-                          <a:schemeClr val="tx1"/>
-                        </a:solidFill>
-                        <a:latin typeface="Andale Mono" charset="0"/>
-                        <a:ea typeface="Andale Mono" charset="0"/>
-                        <a:cs typeface="Andale Mono" charset="0"/>
-                      </a:endParaRPr>
-                    </a:p>
-                  </a:txBody>
-                  <a:tcPr>
-                    <a:noFill/>
-                  </a:tcPr>
-                </a:tc>
-              </a:tr>
-              <a:tr h="354370">
-                <a:tc>
-                  <a:txBody>
-                    <a:bodyPr/>
-                    <a:lstStyle/>
-                    <a:p>
-                      <a:pPr algn="ctr"/>
-                      <a:r>
-                        <a:rPr lang="en-US" b="1" dirty="0" smtClean="0">
-                          <a:solidFill>
-                            <a:schemeClr val="tx1"/>
-                          </a:solidFill>
-                          <a:latin typeface="Andale Mono" charset="0"/>
-                          <a:ea typeface="Andale Mono" charset="0"/>
-                          <a:cs typeface="Andale Mono" charset="0"/>
-                        </a:rPr>
-                        <a:t>2,643 (+88)</a:t>
-                      </a:r>
-                      <a:endParaRPr lang="en-US" b="1" dirty="0">
-                        <a:solidFill>
-                          <a:schemeClr val="tx1"/>
-                        </a:solidFill>
-                        <a:latin typeface="Andale Mono" charset="0"/>
-                        <a:ea typeface="Andale Mono" charset="0"/>
-                        <a:cs typeface="Andale Mono" charset="0"/>
-                      </a:endParaRPr>
-                    </a:p>
-                  </a:txBody>
-                  <a:tcPr>
-                    <a:noFill/>
-                  </a:tcPr>
-                </a:tc>
-              </a:tr>
-              <a:tr h="354370">
-                <a:tc>
-                  <a:txBody>
-                    <a:bodyPr/>
-                    <a:lstStyle/>
-                    <a:p>
-                      <a:pPr algn="ctr"/>
-                      <a:r>
-                        <a:rPr lang="en-US" b="1" dirty="0" smtClean="0">
-                          <a:solidFill>
-                            <a:schemeClr val="tx1"/>
-                          </a:solidFill>
-                          <a:latin typeface="Andale Mono" charset="0"/>
-                          <a:ea typeface="Andale Mono" charset="0"/>
-                          <a:cs typeface="Andale Mono" charset="0"/>
-                        </a:rPr>
-                        <a:t>2,437 (+143)</a:t>
-                      </a:r>
-                      <a:endParaRPr lang="en-US" b="1" dirty="0">
-                        <a:solidFill>
-                          <a:schemeClr val="tx1"/>
-                        </a:solidFill>
-                        <a:latin typeface="Andale Mono" charset="0"/>
-                        <a:ea typeface="Andale Mono" charset="0"/>
-                        <a:cs typeface="Andale Mono" charset="0"/>
-                      </a:endParaRPr>
-                    </a:p>
-                  </a:txBody>
-                  <a:tcPr>
-                    <a:noFill/>
-                  </a:tcPr>
-                </a:tc>
-              </a:tr>
-              <a:tr h="354370">
-                <a:tc>
-                  <a:txBody>
-                    <a:bodyPr/>
-                    <a:lstStyle/>
-                    <a:p>
-                      <a:pPr algn="ctr"/>
-                      <a:r>
-                        <a:rPr lang="en-US" b="1" dirty="0" smtClean="0">
-                          <a:solidFill>
-                            <a:schemeClr val="tx1"/>
-                          </a:solidFill>
-                          <a:latin typeface="Andale Mono" charset="0"/>
-                          <a:ea typeface="Andale Mono" charset="0"/>
-                          <a:cs typeface="Andale Mono" charset="0"/>
-                        </a:rPr>
-                        <a:t>2,264 (+91)</a:t>
-                      </a:r>
-                      <a:endParaRPr lang="en-US" b="1" dirty="0">
-                        <a:solidFill>
-                          <a:schemeClr val="tx1"/>
-                        </a:solidFill>
-                        <a:latin typeface="Andale Mono" charset="0"/>
-                        <a:ea typeface="Andale Mono" charset="0"/>
-                        <a:cs typeface="Andale Mono" charset="0"/>
-                      </a:endParaRPr>
-                    </a:p>
-                  </a:txBody>
-                  <a:tcPr>
-                    <a:noFill/>
-                  </a:tcPr>
-                </a:tc>
-              </a:tr>
-            </a:tbl>
-          </a:graphicData>
-        </a:graphic>
-      </p:graphicFrame>
-      <p:sp>
-        <p:nvSpPr>
-          <p:cNvPr id="15" name="Rounded Rectangular Callout 14"/>
-          <p:cNvSpPr/>
-          <p:nvPr/>
-        </p:nvSpPr>
-        <p:spPr>
-          <a:xfrm>
-            <a:off x="6570784" y="351514"/>
-            <a:ext cx="4618892" cy="1055576"/>
-          </a:xfrm>
-          <a:prstGeom prst="wedgeRoundRectCallout">
-            <a:avLst>
-              <a:gd name="adj1" fmla="val -23678"/>
-              <a:gd name="adj2" fmla="val 45062"/>
-              <a:gd name="adj3" fmla="val 16667"/>
-            </a:avLst>
-          </a:prstGeom>
-          <a:solidFill>
-            <a:schemeClr val="accent2">
-              <a:lumMod val="20000"/>
-              <a:lumOff val="80000"/>
-            </a:schemeClr>
-          </a:solidFill>
-        </p:spPr>
-        <p:style>
-          <a:lnRef idx="2">
-            <a:schemeClr val="accent1">
-              <a:shade val="50000"/>
-            </a:schemeClr>
-          </a:lnRef>
-          <a:fillRef idx="1">
-            <a:schemeClr val="accent1"/>
-          </a:fillRef>
-          <a:effectRef idx="0">
-            <a:schemeClr val="accent1"/>
-          </a:effectRef>
-          <a:fontRef idx="minor">
-            <a:schemeClr val="lt1"/>
-          </a:fontRef>
-        </p:style>
-        <p:txBody>
-          <a:bodyPr rtlCol="0" anchor="ctr"/>
-          <a:lstStyle/>
-          <a:p>
-            <a:pPr algn="ctr">
-              <a:spcAft>
-                <a:spcPts val="600"/>
-              </a:spcAft>
-            </a:pPr>
-            <a:r>
-              <a:rPr lang="en-US" sz="1200" dirty="0" smtClean="0">
-                <a:solidFill>
-                  <a:schemeClr val="tx1"/>
-                </a:solidFill>
-              </a:rPr>
-              <a:t>In the original data set, ~11% of elevators did not have Zip code data</a:t>
-            </a:r>
-          </a:p>
-          <a:p>
-            <a:pPr algn="ctr">
-              <a:spcAft>
-                <a:spcPts val="600"/>
-              </a:spcAft>
-            </a:pPr>
-            <a:r>
-              <a:rPr lang="en-US" sz="1200" dirty="0" smtClean="0">
-                <a:solidFill>
-                  <a:schemeClr val="tx1"/>
-                </a:solidFill>
-              </a:rPr>
-              <a:t>Using geocoding, I used geolocation (</a:t>
-            </a:r>
-            <a:r>
-              <a:rPr lang="en-US" sz="1200" dirty="0" err="1" smtClean="0">
-                <a:solidFill>
-                  <a:schemeClr val="tx1"/>
-                </a:solidFill>
-              </a:rPr>
-              <a:t>lat</a:t>
-            </a:r>
-            <a:r>
-              <a:rPr lang="en-US" sz="1200" dirty="0" smtClean="0">
-                <a:solidFill>
-                  <a:schemeClr val="tx1"/>
-                </a:solidFill>
-              </a:rPr>
-              <a:t>/longitude) to return Zip code vales that made most of this data usable</a:t>
-            </a:r>
-          </a:p>
-          <a:p>
-            <a:pPr algn="ctr">
-              <a:spcAft>
-                <a:spcPts val="600"/>
-              </a:spcAft>
-            </a:pPr>
-            <a:r>
-              <a:rPr lang="en-US" sz="1200" dirty="0" smtClean="0">
-                <a:solidFill>
-                  <a:schemeClr val="tx1"/>
-                </a:solidFill>
-              </a:rPr>
-              <a:t>~0.2% of dataset (165 elevators) remained unresolvable as their geolocation was inconclusive</a:t>
-            </a:r>
-            <a:endParaRPr lang="en-US" sz="1200" dirty="0">
-              <a:solidFill>
-                <a:schemeClr val="tx1"/>
-              </a:solidFill>
-            </a:endParaRPr>
-          </a:p>
-        </p:txBody>
-      </p:sp>
-    </p:spTree>
-    <p:extLst>
-      <p:ext uri="{BB962C8B-B14F-4D97-AF65-F5344CB8AC3E}">
-        <p14:creationId xmlns:p14="http://schemas.microsoft.com/office/powerpoint/2010/main" val="2045588935"/>
-      </p:ext>
-    </p:extLst>
-  </p:cSld>
-  <p:clrMapOvr>
-    <a:masterClrMapping/>
-  </p:clrMapOvr>
 </p:sld>
 </file>
 

</xml_diff>